<commit_message>
update after writting proposal
</commit_message>
<xml_diff>
--- a/603-ET/social networking ethical issues.pptx
+++ b/603-ET/social networking ethical issues.pptx
@@ -250,7 +250,7 @@
           <a:p>
             <a:fld id="{9EF7D3A6-9E8E-4941-BB94-5A31170A0B6C}" type="datetimeFigureOut">
               <a:rPr lang="en-US" smtClean="0"/>
-              <a:t>9/1/2018</a:t>
+              <a:t>9/25/2018</a:t>
             </a:fld>
             <a:endParaRPr lang="en-US"/>
           </a:p>
@@ -420,7 +420,7 @@
           <a:p>
             <a:fld id="{9EF7D3A6-9E8E-4941-BB94-5A31170A0B6C}" type="datetimeFigureOut">
               <a:rPr lang="en-US" smtClean="0"/>
-              <a:t>9/1/2018</a:t>
+              <a:t>9/25/2018</a:t>
             </a:fld>
             <a:endParaRPr lang="en-US"/>
           </a:p>
@@ -600,7 +600,7 @@
           <a:p>
             <a:fld id="{9EF7D3A6-9E8E-4941-BB94-5A31170A0B6C}" type="datetimeFigureOut">
               <a:rPr lang="en-US" smtClean="0"/>
-              <a:t>9/1/2018</a:t>
+              <a:t>9/25/2018</a:t>
             </a:fld>
             <a:endParaRPr lang="en-US"/>
           </a:p>
@@ -770,7 +770,7 @@
           <a:p>
             <a:fld id="{9EF7D3A6-9E8E-4941-BB94-5A31170A0B6C}" type="datetimeFigureOut">
               <a:rPr lang="en-US" smtClean="0"/>
-              <a:t>9/1/2018</a:t>
+              <a:t>9/25/2018</a:t>
             </a:fld>
             <a:endParaRPr lang="en-US"/>
           </a:p>
@@ -1016,7 +1016,7 @@
           <a:p>
             <a:fld id="{9EF7D3A6-9E8E-4941-BB94-5A31170A0B6C}" type="datetimeFigureOut">
               <a:rPr lang="en-US" smtClean="0"/>
-              <a:t>9/1/2018</a:t>
+              <a:t>9/25/2018</a:t>
             </a:fld>
             <a:endParaRPr lang="en-US"/>
           </a:p>
@@ -1248,7 +1248,7 @@
           <a:p>
             <a:fld id="{9EF7D3A6-9E8E-4941-BB94-5A31170A0B6C}" type="datetimeFigureOut">
               <a:rPr lang="en-US" smtClean="0"/>
-              <a:t>9/1/2018</a:t>
+              <a:t>9/25/2018</a:t>
             </a:fld>
             <a:endParaRPr lang="en-US"/>
           </a:p>
@@ -1615,7 +1615,7 @@
           <a:p>
             <a:fld id="{9EF7D3A6-9E8E-4941-BB94-5A31170A0B6C}" type="datetimeFigureOut">
               <a:rPr lang="en-US" smtClean="0"/>
-              <a:t>9/1/2018</a:t>
+              <a:t>9/25/2018</a:t>
             </a:fld>
             <a:endParaRPr lang="en-US"/>
           </a:p>
@@ -1733,7 +1733,7 @@
           <a:p>
             <a:fld id="{9EF7D3A6-9E8E-4941-BB94-5A31170A0B6C}" type="datetimeFigureOut">
               <a:rPr lang="en-US" smtClean="0"/>
-              <a:t>9/1/2018</a:t>
+              <a:t>9/25/2018</a:t>
             </a:fld>
             <a:endParaRPr lang="en-US"/>
           </a:p>
@@ -1828,7 +1828,7 @@
           <a:p>
             <a:fld id="{9EF7D3A6-9E8E-4941-BB94-5A31170A0B6C}" type="datetimeFigureOut">
               <a:rPr lang="en-US" smtClean="0"/>
-              <a:t>9/1/2018</a:t>
+              <a:t>9/25/2018</a:t>
             </a:fld>
             <a:endParaRPr lang="en-US"/>
           </a:p>
@@ -2105,7 +2105,7 @@
           <a:p>
             <a:fld id="{9EF7D3A6-9E8E-4941-BB94-5A31170A0B6C}" type="datetimeFigureOut">
               <a:rPr lang="en-US" smtClean="0"/>
-              <a:t>9/1/2018</a:t>
+              <a:t>9/25/2018</a:t>
             </a:fld>
             <a:endParaRPr lang="en-US"/>
           </a:p>
@@ -2358,7 +2358,7 @@
           <a:p>
             <a:fld id="{9EF7D3A6-9E8E-4941-BB94-5A31170A0B6C}" type="datetimeFigureOut">
               <a:rPr lang="en-US" smtClean="0"/>
-              <a:t>9/1/2018</a:t>
+              <a:t>9/25/2018</a:t>
             </a:fld>
             <a:endParaRPr lang="en-US"/>
           </a:p>
@@ -2571,7 +2571,7 @@
           <a:p>
             <a:fld id="{9EF7D3A6-9E8E-4941-BB94-5A31170A0B6C}" type="datetimeFigureOut">
               <a:rPr lang="en-US" smtClean="0"/>
-              <a:t>9/1/2018</a:t>
+              <a:t>9/25/2018</a:t>
             </a:fld>
             <a:endParaRPr lang="en-US"/>
           </a:p>
@@ -3164,6 +3164,176 @@
           <a:chExt cx="0" cy="0"/>
         </a:xfrm>
       </p:grpSpPr>
+      <p:sp>
+        <p:nvSpPr>
+          <p:cNvPr id="6" name="Rectangle 5"/>
+          <p:cNvSpPr/>
+          <p:nvPr/>
+        </p:nvSpPr>
+        <p:spPr>
+          <a:xfrm rot="2622125">
+            <a:off x="-1589264" y="2184183"/>
+            <a:ext cx="6643716" cy="4438988"/>
+          </a:xfrm>
+          <a:custGeom>
+            <a:avLst/>
+            <a:gdLst>
+              <a:gd name="connsiteX0" fmla="*/ 0 w 6827592"/>
+              <a:gd name="connsiteY0" fmla="*/ 0 h 3615388"/>
+              <a:gd name="connsiteX1" fmla="*/ 6827592 w 6827592"/>
+              <a:gd name="connsiteY1" fmla="*/ 0 h 3615388"/>
+              <a:gd name="connsiteX2" fmla="*/ 6827592 w 6827592"/>
+              <a:gd name="connsiteY2" fmla="*/ 3615388 h 3615388"/>
+              <a:gd name="connsiteX3" fmla="*/ 0 w 6827592"/>
+              <a:gd name="connsiteY3" fmla="*/ 3615388 h 3615388"/>
+              <a:gd name="connsiteX4" fmla="*/ 0 w 6827592"/>
+              <a:gd name="connsiteY4" fmla="*/ 0 h 3615388"/>
+              <a:gd name="connsiteX0" fmla="*/ 0 w 7275813"/>
+              <a:gd name="connsiteY0" fmla="*/ 1366785 h 4982173"/>
+              <a:gd name="connsiteX1" fmla="*/ 7275813 w 7275813"/>
+              <a:gd name="connsiteY1" fmla="*/ 0 h 4982173"/>
+              <a:gd name="connsiteX2" fmla="*/ 6827592 w 7275813"/>
+              <a:gd name="connsiteY2" fmla="*/ 4982173 h 4982173"/>
+              <a:gd name="connsiteX3" fmla="*/ 0 w 7275813"/>
+              <a:gd name="connsiteY3" fmla="*/ 4982173 h 4982173"/>
+              <a:gd name="connsiteX4" fmla="*/ 0 w 7275813"/>
+              <a:gd name="connsiteY4" fmla="*/ 1366785 h 4982173"/>
+              <a:gd name="connsiteX0" fmla="*/ 403951 w 7275813"/>
+              <a:gd name="connsiteY0" fmla="*/ 572722 h 4982173"/>
+              <a:gd name="connsiteX1" fmla="*/ 7275813 w 7275813"/>
+              <a:gd name="connsiteY1" fmla="*/ 0 h 4982173"/>
+              <a:gd name="connsiteX2" fmla="*/ 6827592 w 7275813"/>
+              <a:gd name="connsiteY2" fmla="*/ 4982173 h 4982173"/>
+              <a:gd name="connsiteX3" fmla="*/ 0 w 7275813"/>
+              <a:gd name="connsiteY3" fmla="*/ 4982173 h 4982173"/>
+              <a:gd name="connsiteX4" fmla="*/ 403951 w 7275813"/>
+              <a:gd name="connsiteY4" fmla="*/ 572722 h 4982173"/>
+              <a:gd name="connsiteX0" fmla="*/ 403951 w 6882728"/>
+              <a:gd name="connsiteY0" fmla="*/ 258255 h 4667706"/>
+              <a:gd name="connsiteX1" fmla="*/ 6882728 w 6882728"/>
+              <a:gd name="connsiteY1" fmla="*/ 0 h 4667706"/>
+              <a:gd name="connsiteX2" fmla="*/ 6827592 w 6882728"/>
+              <a:gd name="connsiteY2" fmla="*/ 4667706 h 4667706"/>
+              <a:gd name="connsiteX3" fmla="*/ 0 w 6882728"/>
+              <a:gd name="connsiteY3" fmla="*/ 4667706 h 4667706"/>
+              <a:gd name="connsiteX4" fmla="*/ 403951 w 6882728"/>
+              <a:gd name="connsiteY4" fmla="*/ 258255 h 4667706"/>
+              <a:gd name="connsiteX0" fmla="*/ 420284 w 6882728"/>
+              <a:gd name="connsiteY0" fmla="*/ 0 h 4669865"/>
+              <a:gd name="connsiteX1" fmla="*/ 6882728 w 6882728"/>
+              <a:gd name="connsiteY1" fmla="*/ 2159 h 4669865"/>
+              <a:gd name="connsiteX2" fmla="*/ 6827592 w 6882728"/>
+              <a:gd name="connsiteY2" fmla="*/ 4669865 h 4669865"/>
+              <a:gd name="connsiteX3" fmla="*/ 0 w 6882728"/>
+              <a:gd name="connsiteY3" fmla="*/ 4669865 h 4669865"/>
+              <a:gd name="connsiteX4" fmla="*/ 420284 w 6882728"/>
+              <a:gd name="connsiteY4" fmla="*/ 0 h 4669865"/>
+              <a:gd name="connsiteX0" fmla="*/ 420284 w 6859514"/>
+              <a:gd name="connsiteY0" fmla="*/ 0 h 4669865"/>
+              <a:gd name="connsiteX1" fmla="*/ 6859514 w 6859514"/>
+              <a:gd name="connsiteY1" fmla="*/ 105947 h 4669865"/>
+              <a:gd name="connsiteX2" fmla="*/ 6827592 w 6859514"/>
+              <a:gd name="connsiteY2" fmla="*/ 4669865 h 4669865"/>
+              <a:gd name="connsiteX3" fmla="*/ 0 w 6859514"/>
+              <a:gd name="connsiteY3" fmla="*/ 4669865 h 4669865"/>
+              <a:gd name="connsiteX4" fmla="*/ 420284 w 6859514"/>
+              <a:gd name="connsiteY4" fmla="*/ 0 h 4669865"/>
+              <a:gd name="connsiteX0" fmla="*/ 432365 w 6859514"/>
+              <a:gd name="connsiteY0" fmla="*/ 0 h 4742611"/>
+              <a:gd name="connsiteX1" fmla="*/ 6859514 w 6859514"/>
+              <a:gd name="connsiteY1" fmla="*/ 178693 h 4742611"/>
+              <a:gd name="connsiteX2" fmla="*/ 6827592 w 6859514"/>
+              <a:gd name="connsiteY2" fmla="*/ 4742611 h 4742611"/>
+              <a:gd name="connsiteX3" fmla="*/ 0 w 6859514"/>
+              <a:gd name="connsiteY3" fmla="*/ 4742611 h 4742611"/>
+              <a:gd name="connsiteX4" fmla="*/ 432365 w 6859514"/>
+              <a:gd name="connsiteY4" fmla="*/ 0 h 4742611"/>
+            </a:gdLst>
+            <a:ahLst/>
+            <a:cxnLst>
+              <a:cxn ang="0">
+                <a:pos x="connsiteX0" y="connsiteY0"/>
+              </a:cxn>
+              <a:cxn ang="0">
+                <a:pos x="connsiteX1" y="connsiteY1"/>
+              </a:cxn>
+              <a:cxn ang="0">
+                <a:pos x="connsiteX2" y="connsiteY2"/>
+              </a:cxn>
+              <a:cxn ang="0">
+                <a:pos x="connsiteX3" y="connsiteY3"/>
+              </a:cxn>
+              <a:cxn ang="0">
+                <a:pos x="connsiteX4" y="connsiteY4"/>
+              </a:cxn>
+            </a:cxnLst>
+            <a:rect l="l" t="t" r="r" b="b"/>
+            <a:pathLst>
+              <a:path w="6859514" h="4742611">
+                <a:moveTo>
+                  <a:pt x="432365" y="0"/>
+                </a:moveTo>
+                <a:lnTo>
+                  <a:pt x="6859514" y="178693"/>
+                </a:lnTo>
+                <a:lnTo>
+                  <a:pt x="6827592" y="4742611"/>
+                </a:lnTo>
+                <a:lnTo>
+                  <a:pt x="0" y="4742611"/>
+                </a:lnTo>
+                <a:lnTo>
+                  <a:pt x="432365" y="0"/>
+                </a:lnTo>
+                <a:close/>
+              </a:path>
+            </a:pathLst>
+          </a:custGeom>
+          <a:blipFill dpi="0" rotWithShape="1">
+            <a:blip r:embed="rId2">
+              <a:alphaModFix amt="30000"/>
+              <a:extLst>
+                <a:ext uri="{28A0092B-C50C-407E-A947-70E740481C1C}">
+                  <a14:useLocalDpi xmlns:a14="http://schemas.microsoft.com/office/drawing/2010/main" val="0"/>
+                </a:ext>
+              </a:extLst>
+            </a:blip>
+            <a:srcRect/>
+            <a:stretch>
+              <a:fillRect/>
+            </a:stretch>
+          </a:blipFill>
+          <a:ln>
+            <a:solidFill>
+              <a:srgbClr val="F7F8FA"/>
+            </a:solidFill>
+          </a:ln>
+        </p:spPr>
+        <p:style>
+          <a:lnRef idx="2">
+            <a:schemeClr val="accent1">
+              <a:shade val="50000"/>
+            </a:schemeClr>
+          </a:lnRef>
+          <a:fillRef idx="1">
+            <a:schemeClr val="accent1"/>
+          </a:fillRef>
+          <a:effectRef idx="0">
+            <a:schemeClr val="accent1"/>
+          </a:effectRef>
+          <a:fontRef idx="minor">
+            <a:schemeClr val="lt1"/>
+          </a:fontRef>
+        </p:style>
+        <p:txBody>
+          <a:bodyPr rtlCol="0" anchor="ctr"/>
+          <a:lstStyle/>
+          <a:p>
+            <a:pPr algn="ctr"/>
+            <a:endParaRPr lang="en-US"/>
+          </a:p>
+        </p:txBody>
+      </p:sp>
       <p:sp>
         <p:nvSpPr>
           <p:cNvPr id="2" name="Title 1"/>
@@ -3966,622 +4136,6 @@
           </p:txBody>
         </p:sp>
       </p:grpSp>
-      <p:grpSp>
-        <p:nvGrpSpPr>
-          <p:cNvPr id="5" name="Group 4"/>
-          <p:cNvGrpSpPr/>
-          <p:nvPr/>
-        </p:nvGrpSpPr>
-        <p:grpSpPr>
-          <a:xfrm>
-            <a:off x="-219911" y="-337067"/>
-            <a:ext cx="2820549" cy="3358978"/>
-            <a:chOff x="-484124" y="0"/>
-            <a:chExt cx="3331291" cy="2899099"/>
-          </a:xfrm>
-          <a:blipFill dpi="0" rotWithShape="1">
-            <a:blip r:embed="rId2">
-              <a:extLst>
-                <a:ext uri="{28A0092B-C50C-407E-A947-70E740481C1C}">
-                  <a14:useLocalDpi xmlns:a14="http://schemas.microsoft.com/office/drawing/2010/main" val="0"/>
-                </a:ext>
-              </a:extLst>
-            </a:blip>
-            <a:srcRect/>
-            <a:stretch>
-              <a:fillRect/>
-            </a:stretch>
-          </a:blipFill>
-        </p:grpSpPr>
-        <p:sp>
-          <p:nvSpPr>
-            <p:cNvPr id="30" name="Diamond 29"/>
-            <p:cNvSpPr/>
-            <p:nvPr/>
-          </p:nvSpPr>
-          <p:spPr>
-            <a:xfrm>
-              <a:off x="484124" y="1473520"/>
-              <a:ext cx="914400" cy="914400"/>
-            </a:xfrm>
-            <a:prstGeom prst="diamond">
-              <a:avLst/>
-            </a:prstGeom>
-            <a:grpFill/>
-            <a:ln>
-              <a:noFill/>
-            </a:ln>
-          </p:spPr>
-          <p:style>
-            <a:lnRef idx="2">
-              <a:schemeClr val="accent1">
-                <a:shade val="50000"/>
-              </a:schemeClr>
-            </a:lnRef>
-            <a:fillRef idx="1">
-              <a:schemeClr val="accent1"/>
-            </a:fillRef>
-            <a:effectRef idx="0">
-              <a:schemeClr val="accent1"/>
-            </a:effectRef>
-            <a:fontRef idx="minor">
-              <a:schemeClr val="lt1"/>
-            </a:fontRef>
-          </p:style>
-          <p:txBody>
-            <a:bodyPr rtlCol="0" anchor="ctr"/>
-            <a:lstStyle/>
-            <a:p>
-              <a:pPr algn="ctr"/>
-              <a:endParaRPr lang="en-US"/>
-            </a:p>
-          </p:txBody>
-        </p:sp>
-        <p:sp>
-          <p:nvSpPr>
-            <p:cNvPr id="35" name="Diamond 34"/>
-            <p:cNvSpPr/>
-            <p:nvPr/>
-          </p:nvSpPr>
-          <p:spPr>
-            <a:xfrm>
-              <a:off x="1465005" y="1455074"/>
-              <a:ext cx="914400" cy="914400"/>
-            </a:xfrm>
-            <a:prstGeom prst="diamond">
-              <a:avLst/>
-            </a:prstGeom>
-            <a:grpFill/>
-            <a:ln>
-              <a:noFill/>
-            </a:ln>
-          </p:spPr>
-          <p:style>
-            <a:lnRef idx="2">
-              <a:schemeClr val="accent1">
-                <a:shade val="50000"/>
-              </a:schemeClr>
-            </a:lnRef>
-            <a:fillRef idx="1">
-              <a:schemeClr val="accent1"/>
-            </a:fillRef>
-            <a:effectRef idx="0">
-              <a:schemeClr val="accent1"/>
-            </a:effectRef>
-            <a:fontRef idx="minor">
-              <a:schemeClr val="lt1"/>
-            </a:fontRef>
-          </p:style>
-          <p:txBody>
-            <a:bodyPr rtlCol="0" anchor="ctr"/>
-            <a:lstStyle/>
-            <a:p>
-              <a:pPr algn="ctr"/>
-              <a:endParaRPr lang="en-US"/>
-            </a:p>
-          </p:txBody>
-        </p:sp>
-        <p:grpSp>
-          <p:nvGrpSpPr>
-            <p:cNvPr id="4" name="Group 3"/>
-            <p:cNvGrpSpPr/>
-            <p:nvPr/>
-          </p:nvGrpSpPr>
-          <p:grpSpPr>
-            <a:xfrm>
-              <a:off x="-484124" y="0"/>
-              <a:ext cx="3331291" cy="2899099"/>
-              <a:chOff x="-484124" y="0"/>
-              <a:chExt cx="3331291" cy="2899099"/>
-            </a:xfrm>
-            <a:grpFill/>
-          </p:grpSpPr>
-          <p:sp>
-            <p:nvSpPr>
-              <p:cNvPr id="3" name="Diamond 2"/>
-              <p:cNvSpPr/>
-              <p:nvPr/>
-            </p:nvSpPr>
-            <p:spPr>
-              <a:xfrm>
-                <a:off x="0" y="0"/>
-                <a:ext cx="914400" cy="914400"/>
-              </a:xfrm>
-              <a:prstGeom prst="diamond">
-                <a:avLst/>
-              </a:prstGeom>
-              <a:grpFill/>
-              <a:ln>
-                <a:noFill/>
-              </a:ln>
-            </p:spPr>
-            <p:style>
-              <a:lnRef idx="2">
-                <a:schemeClr val="accent1">
-                  <a:shade val="50000"/>
-                </a:schemeClr>
-              </a:lnRef>
-              <a:fillRef idx="1">
-                <a:schemeClr val="accent1"/>
-              </a:fillRef>
-              <a:effectRef idx="0">
-                <a:schemeClr val="accent1"/>
-              </a:effectRef>
-              <a:fontRef idx="minor">
-                <a:schemeClr val="lt1"/>
-              </a:fontRef>
-            </p:style>
-            <p:txBody>
-              <a:bodyPr rtlCol="0" anchor="ctr"/>
-              <a:lstStyle/>
-              <a:p>
-                <a:pPr algn="ctr"/>
-                <a:endParaRPr lang="en-US"/>
-              </a:p>
-            </p:txBody>
-          </p:sp>
-          <p:sp>
-            <p:nvSpPr>
-              <p:cNvPr id="19" name="Diamond 18"/>
-              <p:cNvSpPr/>
-              <p:nvPr/>
-            </p:nvSpPr>
-            <p:spPr>
-              <a:xfrm>
-                <a:off x="484124" y="494072"/>
-                <a:ext cx="914400" cy="914400"/>
-              </a:xfrm>
-              <a:prstGeom prst="diamond">
-                <a:avLst/>
-              </a:prstGeom>
-              <a:grpFill/>
-              <a:ln>
-                <a:noFill/>
-              </a:ln>
-            </p:spPr>
-            <p:style>
-              <a:lnRef idx="2">
-                <a:schemeClr val="accent1">
-                  <a:shade val="50000"/>
-                </a:schemeClr>
-              </a:lnRef>
-              <a:fillRef idx="1">
-                <a:schemeClr val="accent1"/>
-              </a:fillRef>
-              <a:effectRef idx="0">
-                <a:schemeClr val="accent1"/>
-              </a:effectRef>
-              <a:fontRef idx="minor">
-                <a:schemeClr val="lt1"/>
-              </a:fontRef>
-            </p:style>
-            <p:txBody>
-              <a:bodyPr rtlCol="0" anchor="ctr"/>
-              <a:lstStyle/>
-              <a:p>
-                <a:pPr algn="ctr"/>
-                <a:endParaRPr lang="en-US"/>
-              </a:p>
-            </p:txBody>
-          </p:sp>
-          <p:sp>
-            <p:nvSpPr>
-              <p:cNvPr id="20" name="Diamond 19"/>
-              <p:cNvSpPr/>
-              <p:nvPr/>
-            </p:nvSpPr>
-            <p:spPr>
-              <a:xfrm>
-                <a:off x="-484124" y="500289"/>
-                <a:ext cx="914400" cy="914400"/>
-              </a:xfrm>
-              <a:prstGeom prst="diamond">
-                <a:avLst/>
-              </a:prstGeom>
-              <a:grpFill/>
-              <a:ln>
-                <a:noFill/>
-              </a:ln>
-            </p:spPr>
-            <p:style>
-              <a:lnRef idx="2">
-                <a:schemeClr val="accent1">
-                  <a:shade val="50000"/>
-                </a:schemeClr>
-              </a:lnRef>
-              <a:fillRef idx="1">
-                <a:schemeClr val="accent1"/>
-              </a:fillRef>
-              <a:effectRef idx="0">
-                <a:schemeClr val="accent1"/>
-              </a:effectRef>
-              <a:fontRef idx="minor">
-                <a:schemeClr val="lt1"/>
-              </a:fontRef>
-            </p:style>
-            <p:txBody>
-              <a:bodyPr rtlCol="0" anchor="ctr"/>
-              <a:lstStyle/>
-              <a:p>
-                <a:pPr algn="ctr"/>
-                <a:endParaRPr lang="en-US"/>
-              </a:p>
-            </p:txBody>
-          </p:sp>
-          <p:sp>
-            <p:nvSpPr>
-              <p:cNvPr id="23" name="Diamond 22"/>
-              <p:cNvSpPr/>
-              <p:nvPr/>
-            </p:nvSpPr>
-            <p:spPr>
-              <a:xfrm>
-                <a:off x="0" y="994361"/>
-                <a:ext cx="914400" cy="914400"/>
-              </a:xfrm>
-              <a:prstGeom prst="diamond">
-                <a:avLst/>
-              </a:prstGeom>
-              <a:grpFill/>
-              <a:ln>
-                <a:noFill/>
-              </a:ln>
-            </p:spPr>
-            <p:style>
-              <a:lnRef idx="2">
-                <a:schemeClr val="accent1">
-                  <a:shade val="50000"/>
-                </a:schemeClr>
-              </a:lnRef>
-              <a:fillRef idx="1">
-                <a:schemeClr val="accent1"/>
-              </a:fillRef>
-              <a:effectRef idx="0">
-                <a:schemeClr val="accent1"/>
-              </a:effectRef>
-              <a:fontRef idx="minor">
-                <a:schemeClr val="lt1"/>
-              </a:fontRef>
-            </p:style>
-            <p:txBody>
-              <a:bodyPr rtlCol="0" anchor="ctr"/>
-              <a:lstStyle/>
-              <a:p>
-                <a:pPr algn="ctr"/>
-                <a:endParaRPr lang="en-US"/>
-              </a:p>
-            </p:txBody>
-          </p:sp>
-          <p:sp>
-            <p:nvSpPr>
-              <p:cNvPr id="24" name="Diamond 23"/>
-              <p:cNvSpPr/>
-              <p:nvPr/>
-            </p:nvSpPr>
-            <p:spPr>
-              <a:xfrm>
-                <a:off x="980881" y="8521"/>
-                <a:ext cx="914400" cy="914400"/>
-              </a:xfrm>
-              <a:prstGeom prst="diamond">
-                <a:avLst/>
-              </a:prstGeom>
-              <a:grpFill/>
-              <a:ln>
-                <a:noFill/>
-              </a:ln>
-            </p:spPr>
-            <p:style>
-              <a:lnRef idx="2">
-                <a:schemeClr val="accent1">
-                  <a:shade val="50000"/>
-                </a:schemeClr>
-              </a:lnRef>
-              <a:fillRef idx="1">
-                <a:schemeClr val="accent1"/>
-              </a:fillRef>
-              <a:effectRef idx="0">
-                <a:schemeClr val="accent1"/>
-              </a:effectRef>
-              <a:fontRef idx="minor">
-                <a:schemeClr val="lt1"/>
-              </a:fontRef>
-            </p:style>
-            <p:txBody>
-              <a:bodyPr rtlCol="0" anchor="ctr"/>
-              <a:lstStyle/>
-              <a:p>
-                <a:pPr algn="ctr"/>
-                <a:endParaRPr lang="en-US"/>
-              </a:p>
-            </p:txBody>
-          </p:sp>
-          <p:sp>
-            <p:nvSpPr>
-              <p:cNvPr id="27" name="Diamond 26"/>
-              <p:cNvSpPr/>
-              <p:nvPr/>
-            </p:nvSpPr>
-            <p:spPr>
-              <a:xfrm>
-                <a:off x="1465005" y="484526"/>
-                <a:ext cx="914400" cy="914400"/>
-              </a:xfrm>
-              <a:prstGeom prst="diamond">
-                <a:avLst/>
-              </a:prstGeom>
-              <a:grpFill/>
-              <a:ln>
-                <a:noFill/>
-              </a:ln>
-            </p:spPr>
-            <p:style>
-              <a:lnRef idx="2">
-                <a:schemeClr val="accent1">
-                  <a:shade val="50000"/>
-                </a:schemeClr>
-              </a:lnRef>
-              <a:fillRef idx="1">
-                <a:schemeClr val="accent1"/>
-              </a:fillRef>
-              <a:effectRef idx="0">
-                <a:schemeClr val="accent1"/>
-              </a:effectRef>
-              <a:fontRef idx="minor">
-                <a:schemeClr val="lt1"/>
-              </a:fontRef>
-            </p:style>
-            <p:txBody>
-              <a:bodyPr rtlCol="0" anchor="ctr"/>
-              <a:lstStyle/>
-              <a:p>
-                <a:pPr algn="ctr"/>
-                <a:endParaRPr lang="en-US"/>
-              </a:p>
-            </p:txBody>
-          </p:sp>
-          <p:sp>
-            <p:nvSpPr>
-              <p:cNvPr id="29" name="Diamond 28"/>
-              <p:cNvSpPr/>
-              <p:nvPr/>
-            </p:nvSpPr>
-            <p:spPr>
-              <a:xfrm>
-                <a:off x="980881" y="994361"/>
-                <a:ext cx="914400" cy="914400"/>
-              </a:xfrm>
-              <a:prstGeom prst="diamond">
-                <a:avLst/>
-              </a:prstGeom>
-              <a:grpFill/>
-              <a:ln>
-                <a:noFill/>
-              </a:ln>
-            </p:spPr>
-            <p:style>
-              <a:lnRef idx="2">
-                <a:schemeClr val="accent1">
-                  <a:shade val="50000"/>
-                </a:schemeClr>
-              </a:lnRef>
-              <a:fillRef idx="1">
-                <a:schemeClr val="accent1"/>
-              </a:fillRef>
-              <a:effectRef idx="0">
-                <a:schemeClr val="accent1"/>
-              </a:effectRef>
-              <a:fontRef idx="minor">
-                <a:schemeClr val="lt1"/>
-              </a:fontRef>
-            </p:style>
-            <p:txBody>
-              <a:bodyPr rtlCol="0" anchor="ctr"/>
-              <a:lstStyle/>
-              <a:p>
-                <a:pPr algn="ctr"/>
-                <a:endParaRPr lang="en-US"/>
-              </a:p>
-            </p:txBody>
-          </p:sp>
-          <p:sp>
-            <p:nvSpPr>
-              <p:cNvPr id="32" name="Diamond 31"/>
-              <p:cNvSpPr/>
-              <p:nvPr/>
-            </p:nvSpPr>
-            <p:spPr>
-              <a:xfrm>
-                <a:off x="-469833" y="1494230"/>
-                <a:ext cx="914400" cy="914400"/>
-              </a:xfrm>
-              <a:prstGeom prst="diamond">
-                <a:avLst/>
-              </a:prstGeom>
-              <a:grpFill/>
-              <a:ln>
-                <a:noFill/>
-              </a:ln>
-            </p:spPr>
-            <p:style>
-              <a:lnRef idx="2">
-                <a:schemeClr val="accent1">
-                  <a:shade val="50000"/>
-                </a:schemeClr>
-              </a:lnRef>
-              <a:fillRef idx="1">
-                <a:schemeClr val="accent1"/>
-              </a:fillRef>
-              <a:effectRef idx="0">
-                <a:schemeClr val="accent1"/>
-              </a:effectRef>
-              <a:fontRef idx="minor">
-                <a:schemeClr val="lt1"/>
-              </a:fontRef>
-            </p:style>
-            <p:txBody>
-              <a:bodyPr rtlCol="0" anchor="ctr"/>
-              <a:lstStyle/>
-              <a:p>
-                <a:pPr algn="ctr"/>
-                <a:endParaRPr lang="en-US"/>
-              </a:p>
-            </p:txBody>
-          </p:sp>
-          <p:sp>
-            <p:nvSpPr>
-              <p:cNvPr id="33" name="Diamond 32"/>
-              <p:cNvSpPr/>
-              <p:nvPr/>
-            </p:nvSpPr>
-            <p:spPr>
-              <a:xfrm>
-                <a:off x="21724" y="1984699"/>
-                <a:ext cx="914400" cy="914400"/>
-              </a:xfrm>
-              <a:prstGeom prst="diamond">
-                <a:avLst/>
-              </a:prstGeom>
-              <a:grpFill/>
-              <a:ln>
-                <a:noFill/>
-              </a:ln>
-            </p:spPr>
-            <p:style>
-              <a:lnRef idx="2">
-                <a:schemeClr val="accent1">
-                  <a:shade val="50000"/>
-                </a:schemeClr>
-              </a:lnRef>
-              <a:fillRef idx="1">
-                <a:schemeClr val="accent1"/>
-              </a:fillRef>
-              <a:effectRef idx="0">
-                <a:schemeClr val="accent1"/>
-              </a:effectRef>
-              <a:fontRef idx="minor">
-                <a:schemeClr val="lt1"/>
-              </a:fontRef>
-            </p:style>
-            <p:txBody>
-              <a:bodyPr rtlCol="0" anchor="ctr"/>
-              <a:lstStyle/>
-              <a:p>
-                <a:pPr algn="ctr"/>
-                <a:endParaRPr lang="en-US"/>
-              </a:p>
-            </p:txBody>
-          </p:sp>
-          <p:sp>
-            <p:nvSpPr>
-              <p:cNvPr id="34" name="Diamond 33"/>
-              <p:cNvSpPr/>
-              <p:nvPr/>
-            </p:nvSpPr>
-            <p:spPr>
-              <a:xfrm>
-                <a:off x="1932767" y="994361"/>
-                <a:ext cx="914400" cy="914400"/>
-              </a:xfrm>
-              <a:prstGeom prst="diamond">
-                <a:avLst/>
-              </a:prstGeom>
-              <a:grpFill/>
-              <a:ln>
-                <a:noFill/>
-              </a:ln>
-            </p:spPr>
-            <p:style>
-              <a:lnRef idx="2">
-                <a:schemeClr val="accent1">
-                  <a:shade val="50000"/>
-                </a:schemeClr>
-              </a:lnRef>
-              <a:fillRef idx="1">
-                <a:schemeClr val="accent1"/>
-              </a:fillRef>
-              <a:effectRef idx="0">
-                <a:schemeClr val="accent1"/>
-              </a:effectRef>
-              <a:fontRef idx="minor">
-                <a:schemeClr val="lt1"/>
-              </a:fontRef>
-            </p:style>
-            <p:txBody>
-              <a:bodyPr rtlCol="0" anchor="ctr"/>
-              <a:lstStyle/>
-              <a:p>
-                <a:pPr algn="ctr"/>
-                <a:endParaRPr lang="en-US"/>
-              </a:p>
-            </p:txBody>
-          </p:sp>
-          <p:sp>
-            <p:nvSpPr>
-              <p:cNvPr id="40" name="Diamond 39"/>
-              <p:cNvSpPr/>
-              <p:nvPr/>
-            </p:nvSpPr>
-            <p:spPr>
-              <a:xfrm>
-                <a:off x="968248" y="1962740"/>
-                <a:ext cx="914400" cy="914400"/>
-              </a:xfrm>
-              <a:prstGeom prst="diamond">
-                <a:avLst/>
-              </a:prstGeom>
-              <a:grpFill/>
-              <a:ln>
-                <a:noFill/>
-              </a:ln>
-            </p:spPr>
-            <p:style>
-              <a:lnRef idx="2">
-                <a:schemeClr val="accent1">
-                  <a:shade val="50000"/>
-                </a:schemeClr>
-              </a:lnRef>
-              <a:fillRef idx="1">
-                <a:schemeClr val="accent1"/>
-              </a:fillRef>
-              <a:effectRef idx="0">
-                <a:schemeClr val="accent1"/>
-              </a:effectRef>
-              <a:fontRef idx="minor">
-                <a:schemeClr val="lt1"/>
-              </a:fontRef>
-            </p:style>
-            <p:txBody>
-              <a:bodyPr rtlCol="0" anchor="ctr"/>
-              <a:lstStyle/>
-              <a:p>
-                <a:pPr algn="ctr"/>
-                <a:endParaRPr lang="en-US"/>
-              </a:p>
-            </p:txBody>
-          </p:sp>
-        </p:grpSp>
-      </p:grpSp>
     </p:spTree>
     <p:extLst>
       <p:ext uri="{BB962C8B-B14F-4D97-AF65-F5344CB8AC3E}">
@@ -5962,7 +5516,7 @@
           <a:p>
             <a:pPr algn="ctr"/>
             <a:r>
-              <a:rPr lang="en-US" dirty="0">
+              <a:rPr lang="en-US" sz="1750" dirty="0">
                 <a:solidFill>
                   <a:schemeClr val="tx1"/>
                 </a:solidFill>
@@ -5971,7 +5525,7 @@
               <a:t>Sending </a:t>
             </a:r>
             <a:r>
-              <a:rPr lang="en-US" dirty="0" smtClean="0">
+              <a:rPr lang="en-US" sz="1750" dirty="0" smtClean="0">
                 <a:solidFill>
                   <a:schemeClr val="tx1"/>
                 </a:solidFill>
@@ -5980,7 +5534,7 @@
               <a:t>inappropriate </a:t>
             </a:r>
             <a:r>
-              <a:rPr lang="en-US" dirty="0">
+              <a:rPr lang="en-US" sz="1750" dirty="0">
                 <a:solidFill>
                   <a:schemeClr val="tx1"/>
                 </a:solidFill>
@@ -6897,8 +6451,8 @@
         </p:nvGrpSpPr>
         <p:grpSpPr>
           <a:xfrm>
-            <a:off x="-162969" y="393515"/>
-            <a:ext cx="2921409" cy="3509889"/>
+            <a:off x="-176981" y="-217543"/>
+            <a:ext cx="1312606" cy="1345792"/>
             <a:chOff x="-10569" y="-281783"/>
             <a:chExt cx="2247165" cy="2315695"/>
           </a:xfrm>
@@ -7855,11 +7409,6 @@
               </a:rPr>
               <a:t>Website has right to material and terminate user accounts that violate the site’s policies</a:t>
             </a:r>
-            <a:endParaRPr lang="en-US" dirty="0">
-              <a:solidFill>
-                <a:schemeClr val="tx1"/>
-              </a:solidFill>
-            </a:endParaRPr>
           </a:p>
         </p:txBody>
       </p:sp>

</xml_diff>